<commit_message>
Live Lecture 3 updates
</commit_message>
<xml_diff>
--- a/lectures/lecture-03/Lecture-Live/Lecture 03 - Lecture.pptx
+++ b/lectures/lecture-03/Lecture-Live/Lecture 03 - Lecture.pptx
@@ -5,28 +5,31 @@
     <p:sldMasterId id="2147483660" r:id="rId1"/>
   </p:sldMasterIdLst>
   <p:notesMasterIdLst>
-    <p:notesMasterId r:id="rId6"/>
+    <p:notesMasterId r:id="rId9"/>
   </p:notesMasterIdLst>
   <p:sldIdLst>
     <p:sldId id="256" r:id="rId2"/>
     <p:sldId id="257" r:id="rId3"/>
     <p:sldId id="261" r:id="rId4"/>
-    <p:sldId id="262" r:id="rId5"/>
+    <p:sldId id="683" r:id="rId5"/>
+    <p:sldId id="684" r:id="rId6"/>
+    <p:sldId id="685" r:id="rId7"/>
+    <p:sldId id="686" r:id="rId8"/>
   </p:sldIdLst>
   <p:sldSz cx="9144000" cy="5143500" type="screen16x9"/>
   <p:notesSz cx="6858000" cy="9144000"/>
   <p:embeddedFontLst>
     <p:embeddedFont>
       <p:font typeface="Calibri" panose="020F0502020204030204" pitchFamily="34" charset="0"/>
-      <p:regular r:id="rId7"/>
-      <p:bold r:id="rId8"/>
-      <p:italic r:id="rId9"/>
-      <p:boldItalic r:id="rId10"/>
+      <p:regular r:id="rId10"/>
+      <p:bold r:id="rId11"/>
+      <p:italic r:id="rId12"/>
+      <p:boldItalic r:id="rId13"/>
     </p:embeddedFont>
     <p:embeddedFont>
       <p:font typeface="Calibri Light" panose="020F0302020204030204" pitchFamily="34" charset="0"/>
-      <p:regular r:id="rId11"/>
-      <p:italic r:id="rId12"/>
+      <p:regular r:id="rId14"/>
+      <p:italic r:id="rId15"/>
     </p:embeddedFont>
   </p:embeddedFontLst>
   <p:defaultTextStyle>
@@ -4281,10 +4284,10 @@
       </p:grpSpPr>
       <p:pic>
         <p:nvPicPr>
-          <p:cNvPr id="5" name="Picture 4" descr="Graphical user interface, text, application, table&#10;&#10;Description automatically generated">
-            <a:extLst>
-              <a:ext uri="{FF2B5EF4-FFF2-40B4-BE49-F238E27FC236}">
-                <a16:creationId xmlns:a16="http://schemas.microsoft.com/office/drawing/2014/main" id="{24F92555-FF34-4DA2-9E30-EF16F08B5B30}"/>
+          <p:cNvPr id="12" name="Picture 11">
+            <a:extLst>
+              <a:ext uri="{FF2B5EF4-FFF2-40B4-BE49-F238E27FC236}">
+                <a16:creationId xmlns:a16="http://schemas.microsoft.com/office/drawing/2014/main" id="{75B506DC-FB2A-46BC-9F31-2404A2D13361}"/>
               </a:ext>
             </a:extLst>
           </p:cNvPr>
@@ -4301,8 +4304,38 @@
         </p:blipFill>
         <p:spPr>
           <a:xfrm>
-            <a:off x="2589688" y="0"/>
-            <a:ext cx="3964625" cy="5143500"/>
+            <a:off x="1657350" y="0"/>
+            <a:ext cx="5943600" cy="4110694"/>
+          </a:xfrm>
+          <a:prstGeom prst="rect">
+            <a:avLst/>
+          </a:prstGeom>
+        </p:spPr>
+      </p:pic>
+      <p:pic>
+        <p:nvPicPr>
+          <p:cNvPr id="14" name="Picture 13">
+            <a:extLst>
+              <a:ext uri="{FF2B5EF4-FFF2-40B4-BE49-F238E27FC236}">
+                <a16:creationId xmlns:a16="http://schemas.microsoft.com/office/drawing/2014/main" id="{D418E903-80C4-4B1A-B2FA-2EEA8130ED7B}"/>
+              </a:ext>
+            </a:extLst>
+          </p:cNvPr>
+          <p:cNvPicPr>
+            <a:picLocks noChangeAspect="1"/>
+          </p:cNvPicPr>
+          <p:nvPr/>
+        </p:nvPicPr>
+        <p:blipFill>
+          <a:blip r:embed="rId3"/>
+          <a:stretch>
+            <a:fillRect/>
+          </a:stretch>
+        </p:blipFill>
+        <p:spPr>
+          <a:xfrm>
+            <a:off x="971550" y="4167843"/>
+            <a:ext cx="7470527" cy="918507"/>
           </a:xfrm>
           <a:prstGeom prst="rect">
             <a:avLst/>
@@ -4312,7 +4345,277 @@
     </p:spTree>
     <p:extLst>
       <p:ext uri="{BB962C8B-B14F-4D97-AF65-F5344CB8AC3E}">
-        <p14:creationId xmlns:p14="http://schemas.microsoft.com/office/powerpoint/2010/main" val="2160221894"/>
+        <p14:creationId xmlns:p14="http://schemas.microsoft.com/office/powerpoint/2010/main" val="3375963997"/>
+      </p:ext>
+    </p:extLst>
+  </p:cSld>
+  <p:clrMapOvr>
+    <a:masterClrMapping/>
+  </p:clrMapOvr>
+</p:sld>
+</file>
+
+<file path=ppt/slides/slide5.xml><?xml version="1.0" encoding="utf-8"?>
+<p:sld xmlns:a="http://schemas.openxmlformats.org/drawingml/2006/main" xmlns:r="http://schemas.openxmlformats.org/officeDocument/2006/relationships" xmlns:p="http://schemas.openxmlformats.org/presentationml/2006/main">
+  <p:cSld>
+    <p:spTree>
+      <p:nvGrpSpPr>
+        <p:cNvPr id="1" name=""/>
+        <p:cNvGrpSpPr/>
+        <p:nvPr/>
+      </p:nvGrpSpPr>
+      <p:grpSpPr>
+        <a:xfrm>
+          <a:off x="0" y="0"/>
+          <a:ext cx="0" cy="0"/>
+          <a:chOff x="0" y="0"/>
+          <a:chExt cx="0" cy="0"/>
+        </a:xfrm>
+      </p:grpSpPr>
+      <p:pic>
+        <p:nvPicPr>
+          <p:cNvPr id="12" name="Picture 11">
+            <a:extLst>
+              <a:ext uri="{FF2B5EF4-FFF2-40B4-BE49-F238E27FC236}">
+                <a16:creationId xmlns:a16="http://schemas.microsoft.com/office/drawing/2014/main" id="{75B506DC-FB2A-46BC-9F31-2404A2D13361}"/>
+              </a:ext>
+            </a:extLst>
+          </p:cNvPr>
+          <p:cNvPicPr>
+            <a:picLocks noChangeAspect="1"/>
+          </p:cNvPicPr>
+          <p:nvPr/>
+        </p:nvPicPr>
+        <p:blipFill>
+          <a:blip r:embed="rId2"/>
+          <a:stretch>
+            <a:fillRect/>
+          </a:stretch>
+        </p:blipFill>
+        <p:spPr>
+          <a:xfrm>
+            <a:off x="1657350" y="0"/>
+            <a:ext cx="5943600" cy="4110694"/>
+          </a:xfrm>
+          <a:prstGeom prst="rect">
+            <a:avLst/>
+          </a:prstGeom>
+        </p:spPr>
+      </p:pic>
+      <p:pic>
+        <p:nvPicPr>
+          <p:cNvPr id="3" name="Picture 2">
+            <a:extLst>
+              <a:ext uri="{FF2B5EF4-FFF2-40B4-BE49-F238E27FC236}">
+                <a16:creationId xmlns:a16="http://schemas.microsoft.com/office/drawing/2014/main" id="{31169849-7CFB-4BAB-B87B-94A4E76C155B}"/>
+              </a:ext>
+            </a:extLst>
+          </p:cNvPr>
+          <p:cNvPicPr>
+            <a:picLocks noChangeAspect="1"/>
+          </p:cNvPicPr>
+          <p:nvPr/>
+        </p:nvPicPr>
+        <p:blipFill>
+          <a:blip r:embed="rId3"/>
+          <a:stretch>
+            <a:fillRect/>
+          </a:stretch>
+        </p:blipFill>
+        <p:spPr>
+          <a:xfrm>
+            <a:off x="971550" y="4171950"/>
+            <a:ext cx="7375653" cy="914400"/>
+          </a:xfrm>
+          <a:prstGeom prst="rect">
+            <a:avLst/>
+          </a:prstGeom>
+        </p:spPr>
+      </p:pic>
+    </p:spTree>
+    <p:extLst>
+      <p:ext uri="{BB962C8B-B14F-4D97-AF65-F5344CB8AC3E}">
+        <p14:creationId xmlns:p14="http://schemas.microsoft.com/office/powerpoint/2010/main" val="730568947"/>
+      </p:ext>
+    </p:extLst>
+  </p:cSld>
+  <p:clrMapOvr>
+    <a:masterClrMapping/>
+  </p:clrMapOvr>
+</p:sld>
+</file>
+
+<file path=ppt/slides/slide6.xml><?xml version="1.0" encoding="utf-8"?>
+<p:sld xmlns:a="http://schemas.openxmlformats.org/drawingml/2006/main" xmlns:r="http://schemas.openxmlformats.org/officeDocument/2006/relationships" xmlns:p="http://schemas.openxmlformats.org/presentationml/2006/main">
+  <p:cSld>
+    <p:spTree>
+      <p:nvGrpSpPr>
+        <p:cNvPr id="1" name=""/>
+        <p:cNvGrpSpPr/>
+        <p:nvPr/>
+      </p:nvGrpSpPr>
+      <p:grpSpPr>
+        <a:xfrm>
+          <a:off x="0" y="0"/>
+          <a:ext cx="0" cy="0"/>
+          <a:chOff x="0" y="0"/>
+          <a:chExt cx="0" cy="0"/>
+        </a:xfrm>
+      </p:grpSpPr>
+      <p:pic>
+        <p:nvPicPr>
+          <p:cNvPr id="12" name="Picture 11">
+            <a:extLst>
+              <a:ext uri="{FF2B5EF4-FFF2-40B4-BE49-F238E27FC236}">
+                <a16:creationId xmlns:a16="http://schemas.microsoft.com/office/drawing/2014/main" id="{75B506DC-FB2A-46BC-9F31-2404A2D13361}"/>
+              </a:ext>
+            </a:extLst>
+          </p:cNvPr>
+          <p:cNvPicPr>
+            <a:picLocks noChangeAspect="1"/>
+          </p:cNvPicPr>
+          <p:nvPr/>
+        </p:nvPicPr>
+        <p:blipFill>
+          <a:blip r:embed="rId2"/>
+          <a:stretch>
+            <a:fillRect/>
+          </a:stretch>
+        </p:blipFill>
+        <p:spPr>
+          <a:xfrm>
+            <a:off x="1657350" y="0"/>
+            <a:ext cx="5943600" cy="4110694"/>
+          </a:xfrm>
+          <a:prstGeom prst="rect">
+            <a:avLst/>
+          </a:prstGeom>
+        </p:spPr>
+      </p:pic>
+      <p:pic>
+        <p:nvPicPr>
+          <p:cNvPr id="3" name="Picture 2">
+            <a:extLst>
+              <a:ext uri="{FF2B5EF4-FFF2-40B4-BE49-F238E27FC236}">
+                <a16:creationId xmlns:a16="http://schemas.microsoft.com/office/drawing/2014/main" id="{7414C84F-5CE9-4F9F-97B0-31D1C649A38E}"/>
+              </a:ext>
+            </a:extLst>
+          </p:cNvPr>
+          <p:cNvPicPr>
+            <a:picLocks noChangeAspect="1"/>
+          </p:cNvPicPr>
+          <p:nvPr/>
+        </p:nvPicPr>
+        <p:blipFill>
+          <a:blip r:embed="rId3"/>
+          <a:stretch>
+            <a:fillRect/>
+          </a:stretch>
+        </p:blipFill>
+        <p:spPr>
+          <a:xfrm>
+            <a:off x="1738198" y="4171950"/>
+            <a:ext cx="5781905" cy="971550"/>
+          </a:xfrm>
+          <a:prstGeom prst="rect">
+            <a:avLst/>
+          </a:prstGeom>
+        </p:spPr>
+      </p:pic>
+    </p:spTree>
+    <p:extLst>
+      <p:ext uri="{BB962C8B-B14F-4D97-AF65-F5344CB8AC3E}">
+        <p14:creationId xmlns:p14="http://schemas.microsoft.com/office/powerpoint/2010/main" val="1997791443"/>
+      </p:ext>
+    </p:extLst>
+  </p:cSld>
+  <p:clrMapOvr>
+    <a:masterClrMapping/>
+  </p:clrMapOvr>
+</p:sld>
+</file>
+
+<file path=ppt/slides/slide7.xml><?xml version="1.0" encoding="utf-8"?>
+<p:sld xmlns:a="http://schemas.openxmlformats.org/drawingml/2006/main" xmlns:r="http://schemas.openxmlformats.org/officeDocument/2006/relationships" xmlns:p="http://schemas.openxmlformats.org/presentationml/2006/main">
+  <p:cSld>
+    <p:spTree>
+      <p:nvGrpSpPr>
+        <p:cNvPr id="1" name=""/>
+        <p:cNvGrpSpPr/>
+        <p:nvPr/>
+      </p:nvGrpSpPr>
+      <p:grpSpPr>
+        <a:xfrm>
+          <a:off x="0" y="0"/>
+          <a:ext cx="0" cy="0"/>
+          <a:chOff x="0" y="0"/>
+          <a:chExt cx="0" cy="0"/>
+        </a:xfrm>
+      </p:grpSpPr>
+      <p:pic>
+        <p:nvPicPr>
+          <p:cNvPr id="12" name="Picture 11">
+            <a:extLst>
+              <a:ext uri="{FF2B5EF4-FFF2-40B4-BE49-F238E27FC236}">
+                <a16:creationId xmlns:a16="http://schemas.microsoft.com/office/drawing/2014/main" id="{75B506DC-FB2A-46BC-9F31-2404A2D13361}"/>
+              </a:ext>
+            </a:extLst>
+          </p:cNvPr>
+          <p:cNvPicPr>
+            <a:picLocks noChangeAspect="1"/>
+          </p:cNvPicPr>
+          <p:nvPr/>
+        </p:nvPicPr>
+        <p:blipFill>
+          <a:blip r:embed="rId2"/>
+          <a:stretch>
+            <a:fillRect/>
+          </a:stretch>
+        </p:blipFill>
+        <p:spPr>
+          <a:xfrm>
+            <a:off x="1657350" y="0"/>
+            <a:ext cx="5943600" cy="4110694"/>
+          </a:xfrm>
+          <a:prstGeom prst="rect">
+            <a:avLst/>
+          </a:prstGeom>
+        </p:spPr>
+      </p:pic>
+      <p:pic>
+        <p:nvPicPr>
+          <p:cNvPr id="3" name="Picture 2">
+            <a:extLst>
+              <a:ext uri="{FF2B5EF4-FFF2-40B4-BE49-F238E27FC236}">
+                <a16:creationId xmlns:a16="http://schemas.microsoft.com/office/drawing/2014/main" id="{106B89BC-0D8E-453D-BED8-9C4A95DBCB01}"/>
+              </a:ext>
+            </a:extLst>
+          </p:cNvPr>
+          <p:cNvPicPr>
+            <a:picLocks noChangeAspect="1"/>
+          </p:cNvPicPr>
+          <p:nvPr/>
+        </p:nvPicPr>
+        <p:blipFill>
+          <a:blip r:embed="rId3"/>
+          <a:stretch>
+            <a:fillRect/>
+          </a:stretch>
+        </p:blipFill>
+        <p:spPr>
+          <a:xfrm>
+            <a:off x="1743573" y="4167844"/>
+            <a:ext cx="5771155" cy="975656"/>
+          </a:xfrm>
+          <a:prstGeom prst="rect">
+            <a:avLst/>
+          </a:prstGeom>
+        </p:spPr>
+      </p:pic>
+    </p:spTree>
+    <p:extLst>
+      <p:ext uri="{BB962C8B-B14F-4D97-AF65-F5344CB8AC3E}">
+        <p14:creationId xmlns:p14="http://schemas.microsoft.com/office/powerpoint/2010/main" val="2618115003"/>
       </p:ext>
     </p:extLst>
   </p:cSld>

</xml_diff>